<commit_message>
Add UML image for DG
</commit_message>
<xml_diff>
--- a/docs/diagrams/SequenceDiagramforSave.pptx
+++ b/docs/diagrams/SequenceDiagramforSave.pptx
@@ -5712,251 +5712,404 @@
           <a:chExt cx="0" cy="0"/>
         </a:xfrm>
       </p:grpSpPr>
-      <p:graphicFrame>
-        <p:nvGraphicFramePr>
-          <p:cNvPr id="2" name="Table 1">
+      <p:sp>
+        <p:nvSpPr>
+          <p:cNvPr id="7" name="Rectangle 8">
             <a:extLst>
               <a:ext uri="{FF2B5EF4-FFF2-40B4-BE49-F238E27FC236}">
-                <a16:creationId xmlns:a16="http://schemas.microsoft.com/office/drawing/2014/main" id="{E70A95CF-177A-F34B-8BB0-DE6BD8119827}"/>
+                <a16:creationId xmlns:a16="http://schemas.microsoft.com/office/drawing/2014/main" id="{A90748A2-4053-1F4B-AE0C-9C15236A2B5F}"/>
               </a:ext>
             </a:extLst>
           </p:cNvPr>
-          <p:cNvGraphicFramePr>
-            <a:graphicFrameLocks noGrp="1"/>
-          </p:cNvGraphicFramePr>
-          <p:nvPr>
-            <p:extLst>
-              <p:ext uri="{D42A27DB-BD31-4B8C-83A1-F6EECF244321}">
-                <p14:modId xmlns:p14="http://schemas.microsoft.com/office/powerpoint/2010/main" val="348086987"/>
-              </p:ext>
-            </p:extLst>
-          </p:nvPr>
-        </p:nvGraphicFramePr>
-        <p:xfrm>
-          <a:off x="637997" y="2769442"/>
-          <a:ext cx="1833356" cy="410363"/>
-        </p:xfrm>
-        <a:graphic>
-          <a:graphicData uri="http://schemas.openxmlformats.org/drawingml/2006/table">
-            <a:tbl>
-              <a:tblPr>
-                <a:tableStyleId>{306799F8-075E-4A3A-A7F6-7FBC6576F1A4}</a:tableStyleId>
-              </a:tblPr>
-              <a:tblGrid>
-                <a:gridCol w="1833356">
-                  <a:extLst>
-                    <a:ext uri="{9D8B030D-6E8A-4147-A177-3AD203B41FA5}">
-                      <a16:colId xmlns:a16="http://schemas.microsoft.com/office/drawing/2014/main" val="4240773277"/>
-                    </a:ext>
-                  </a:extLst>
-                </a:gridCol>
-              </a:tblGrid>
-              <a:tr h="410363">
-                <a:tc>
-                  <a:txBody>
-                    <a:bodyPr/>
-                    <a:lstStyle/>
-                    <a:p>
-                      <a:pPr algn="ctr"/>
-                      <a:r>
-                        <a:rPr lang="en-SG" b="1" u="none" dirty="0"/>
-                        <a:t>File</a:t>
-                      </a:r>
-                      <a:endParaRPr lang="en-SG" sz="1600" b="1" u="none" dirty="0"/>
-                    </a:p>
-                  </a:txBody>
-                  <a:tcPr>
-                    <a:noFill/>
-                  </a:tcPr>
-                </a:tc>
-                <a:extLst>
-                  <a:ext uri="{0D108BD9-81ED-4DB2-BD59-A6C34878D82A}">
-                    <a16:rowId xmlns:a16="http://schemas.microsoft.com/office/drawing/2014/main" val="2194462629"/>
-                  </a:ext>
-                </a:extLst>
-              </a:tr>
-            </a:tbl>
-          </a:graphicData>
-        </a:graphic>
-      </p:graphicFrame>
-      <p:graphicFrame>
-        <p:nvGraphicFramePr>
-          <p:cNvPr id="3" name="Table 2">
+          <p:cNvSpPr/>
+          <p:nvPr/>
+        </p:nvSpPr>
+        <p:spPr>
+          <a:xfrm>
+            <a:off x="1981200" y="2007561"/>
+            <a:ext cx="2962620" cy="346760"/>
+          </a:xfrm>
+          <a:prstGeom prst="rect">
+            <a:avLst/>
+          </a:prstGeom>
+          <a:ln/>
+        </p:spPr>
+        <p:style>
+          <a:lnRef idx="2">
+            <a:schemeClr val="accent3">
+              <a:shade val="50000"/>
+            </a:schemeClr>
+          </a:lnRef>
+          <a:fillRef idx="1">
+            <a:schemeClr val="accent3"/>
+          </a:fillRef>
+          <a:effectRef idx="0">
+            <a:schemeClr val="accent3"/>
+          </a:effectRef>
+          <a:fontRef idx="minor">
+            <a:schemeClr val="lt1"/>
+          </a:fontRef>
+        </p:style>
+        <p:txBody>
+          <a:bodyPr rtlCol="0" anchor="ctr"/>
+          <a:lstStyle/>
+          <a:p>
+            <a:pPr algn="ctr"/>
+            <a:r>
+              <a:rPr lang="en-US" sz="1400" b="1" dirty="0" err="1">
+                <a:solidFill>
+                  <a:schemeClr val="bg1"/>
+                </a:solidFill>
+              </a:rPr>
+              <a:t>SaveCommand</a:t>
+            </a:r>
+            <a:endParaRPr lang="en-SG" sz="1050" b="1" dirty="0">
+              <a:solidFill>
+                <a:schemeClr val="bg1"/>
+              </a:solidFill>
+            </a:endParaRPr>
+          </a:p>
+        </p:txBody>
+      </p:sp>
+      <p:cxnSp>
+        <p:nvCxnSpPr>
+          <p:cNvPr id="8" name="Straight Connector 7">
             <a:extLst>
               <a:ext uri="{FF2B5EF4-FFF2-40B4-BE49-F238E27FC236}">
-                <a16:creationId xmlns:a16="http://schemas.microsoft.com/office/drawing/2014/main" id="{1B097F73-2F49-4245-9DC7-DCF3FBD3FBA0}"/>
-              </a:ext>
-            </a:extLst>
-          </p:cNvPr>
-          <p:cNvGraphicFramePr>
-            <a:graphicFrameLocks noGrp="1"/>
-          </p:cNvGraphicFramePr>
-          <p:nvPr>
-            <p:extLst>
-              <p:ext uri="{D42A27DB-BD31-4B8C-83A1-F6EECF244321}">
-                <p14:modId xmlns:p14="http://schemas.microsoft.com/office/powerpoint/2010/main" val="2032475843"/>
-              </p:ext>
-            </p:extLst>
-          </p:nvPr>
-        </p:nvGraphicFramePr>
-        <p:xfrm>
-          <a:off x="637997" y="1994338"/>
-          <a:ext cx="1833356" cy="410363"/>
-        </p:xfrm>
-        <a:graphic>
-          <a:graphicData uri="http://schemas.openxmlformats.org/drawingml/2006/table">
-            <a:tbl>
-              <a:tblPr>
-                <a:tableStyleId>{306799F8-075E-4A3A-A7F6-7FBC6576F1A4}</a:tableStyleId>
-              </a:tblPr>
-              <a:tblGrid>
-                <a:gridCol w="1833356">
-                  <a:extLst>
-                    <a:ext uri="{9D8B030D-6E8A-4147-A177-3AD203B41FA5}">
-                      <a16:colId xmlns:a16="http://schemas.microsoft.com/office/drawing/2014/main" val="4240773277"/>
-                    </a:ext>
-                  </a:extLst>
-                </a:gridCol>
-              </a:tblGrid>
-              <a:tr h="410363">
-                <a:tc>
-                  <a:txBody>
-                    <a:bodyPr/>
-                    <a:lstStyle/>
-                    <a:p>
-                      <a:pPr algn="ctr"/>
-                      <a:r>
-                        <a:rPr lang="en-SG" b="1" u="none" dirty="0" err="1"/>
-                        <a:t>SaveCommand</a:t>
-                      </a:r>
-                      <a:endParaRPr lang="en-SG" sz="1600" b="1" u="none" dirty="0"/>
-                    </a:p>
-                  </a:txBody>
-                  <a:tcPr>
-                    <a:noFill/>
-                  </a:tcPr>
-                </a:tc>
-                <a:extLst>
-                  <a:ext uri="{0D108BD9-81ED-4DB2-BD59-A6C34878D82A}">
-                    <a16:rowId xmlns:a16="http://schemas.microsoft.com/office/drawing/2014/main" val="2194462629"/>
-                  </a:ext>
-                </a:extLst>
-              </a:tr>
-            </a:tbl>
-          </a:graphicData>
-        </a:graphic>
-      </p:graphicFrame>
-      <p:graphicFrame>
-        <p:nvGraphicFramePr>
-          <p:cNvPr id="4" name="Table 3">
-            <a:extLst>
-              <a:ext uri="{FF2B5EF4-FFF2-40B4-BE49-F238E27FC236}">
-                <a16:creationId xmlns:a16="http://schemas.microsoft.com/office/drawing/2014/main" id="{4D9B9DEA-67CF-314D-8A06-20865355B05F}"/>
-              </a:ext>
-            </a:extLst>
-          </p:cNvPr>
-          <p:cNvGraphicFramePr>
-            <a:graphicFrameLocks noGrp="1"/>
-          </p:cNvGraphicFramePr>
-          <p:nvPr>
-            <p:extLst>
-              <p:ext uri="{D42A27DB-BD31-4B8C-83A1-F6EECF244321}">
-                <p14:modId xmlns:p14="http://schemas.microsoft.com/office/powerpoint/2010/main" val="3225843222"/>
-              </p:ext>
-            </p:extLst>
-          </p:nvPr>
-        </p:nvGraphicFramePr>
-        <p:xfrm>
-          <a:off x="637997" y="1219234"/>
-          <a:ext cx="1833356" cy="410363"/>
-        </p:xfrm>
-        <a:graphic>
-          <a:graphicData uri="http://schemas.openxmlformats.org/drawingml/2006/table">
-            <a:tbl>
-              <a:tblPr>
-                <a:tableStyleId>{306799F8-075E-4A3A-A7F6-7FBC6576F1A4}</a:tableStyleId>
-              </a:tblPr>
-              <a:tblGrid>
-                <a:gridCol w="1833356">
-                  <a:extLst>
-                    <a:ext uri="{9D8B030D-6E8A-4147-A177-3AD203B41FA5}">
-                      <a16:colId xmlns:a16="http://schemas.microsoft.com/office/drawing/2014/main" val="4240773277"/>
-                    </a:ext>
-                  </a:extLst>
-                </a:gridCol>
-              </a:tblGrid>
-              <a:tr h="410363">
-                <a:tc>
-                  <a:txBody>
-                    <a:bodyPr/>
-                    <a:lstStyle/>
-                    <a:p>
-                      <a:pPr algn="ctr"/>
-                      <a:r>
-                        <a:rPr lang="en-SG" b="1" u="none" dirty="0"/>
-                        <a:t>Command</a:t>
-                      </a:r>
-                      <a:endParaRPr lang="en-SG" sz="1600" b="1" u="none" dirty="0"/>
-                    </a:p>
-                  </a:txBody>
-                  <a:tcPr>
-                    <a:noFill/>
-                  </a:tcPr>
-                </a:tc>
-                <a:extLst>
-                  <a:ext uri="{0D108BD9-81ED-4DB2-BD59-A6C34878D82A}">
-                    <a16:rowId xmlns:a16="http://schemas.microsoft.com/office/drawing/2014/main" val="2194462629"/>
-                  </a:ext>
-                </a:extLst>
-              </a:tr>
-            </a:tbl>
-          </a:graphicData>
-        </a:graphic>
-      </p:graphicFrame>
-      <p:cxnSp>
-        <p:nvCxnSpPr>
-          <p:cNvPr id="6" name="Straight Arrow Connector 5">
-            <a:extLst>
-              <a:ext uri="{FF2B5EF4-FFF2-40B4-BE49-F238E27FC236}">
-                <a16:creationId xmlns:a16="http://schemas.microsoft.com/office/drawing/2014/main" id="{58896388-FBCC-554D-A20A-CF1A830C48CE}"/>
+                <a16:creationId xmlns:a16="http://schemas.microsoft.com/office/drawing/2014/main" id="{526D96DB-788F-734E-A0A0-E8601618E4A6}"/>
               </a:ext>
             </a:extLst>
           </p:cNvPr>
           <p:cNvCxnSpPr>
             <a:cxnSpLocks/>
-            <a:stCxn id="3" idx="0"/>
-            <a:endCxn id="4" idx="2"/>
+            <a:stCxn id="7" idx="0"/>
+            <a:endCxn id="9" idx="0"/>
           </p:cNvCxnSpPr>
           <p:nvPr/>
         </p:nvCxnSpPr>
         <p:spPr>
           <a:xfrm flipV="1">
-            <a:off x="1554675" y="1629597"/>
-            <a:ext cx="0" cy="364741"/>
-          </a:xfrm>
-          <a:prstGeom prst="straightConnector1">
+            <a:off x="3462510" y="1687744"/>
+            <a:ext cx="2263" cy="319817"/>
+          </a:xfrm>
+          <a:prstGeom prst="line">
             <a:avLst/>
           </a:prstGeom>
-          <a:ln w="66675">
-            <a:headEnd w="lg" len="lg"/>
-            <a:tailEnd type="triangle"/>
-          </a:ln>
         </p:spPr>
         <p:style>
-          <a:lnRef idx="1">
-            <a:schemeClr val="accent1"/>
+          <a:lnRef idx="2">
+            <a:schemeClr val="accent3">
+              <a:shade val="50000"/>
+            </a:schemeClr>
           </a:lnRef>
-          <a:fillRef idx="0">
-            <a:schemeClr val="accent1"/>
+          <a:fillRef idx="1">
+            <a:schemeClr val="accent3"/>
           </a:fillRef>
           <a:effectRef idx="0">
-            <a:schemeClr val="accent1"/>
+            <a:schemeClr val="accent3"/>
           </a:effectRef>
           <a:fontRef idx="minor">
-            <a:schemeClr val="tx1"/>
+            <a:schemeClr val="lt1"/>
           </a:fontRef>
         </p:style>
       </p:cxnSp>
+      <p:sp>
+        <p:nvSpPr>
+          <p:cNvPr id="9" name="Isosceles Triangle 10">
+            <a:extLst>
+              <a:ext uri="{FF2B5EF4-FFF2-40B4-BE49-F238E27FC236}">
+                <a16:creationId xmlns:a16="http://schemas.microsoft.com/office/drawing/2014/main" id="{3C51DA7D-98B6-8247-BACD-12E515589416}"/>
+              </a:ext>
+            </a:extLst>
+          </p:cNvPr>
+          <p:cNvSpPr/>
+          <p:nvPr/>
+        </p:nvSpPr>
+        <p:spPr>
+          <a:xfrm>
+            <a:off x="3322625" y="1687744"/>
+            <a:ext cx="284295" cy="156155"/>
+          </a:xfrm>
+          <a:prstGeom prst="triangle">
+            <a:avLst/>
+          </a:prstGeom>
+        </p:spPr>
+        <p:style>
+          <a:lnRef idx="2">
+            <a:schemeClr val="accent3">
+              <a:shade val="50000"/>
+            </a:schemeClr>
+          </a:lnRef>
+          <a:fillRef idx="1">
+            <a:schemeClr val="accent3"/>
+          </a:fillRef>
+          <a:effectRef idx="0">
+            <a:schemeClr val="accent3"/>
+          </a:effectRef>
+          <a:fontRef idx="minor">
+            <a:schemeClr val="lt1"/>
+          </a:fontRef>
+        </p:style>
+        <p:txBody>
+          <a:bodyPr rtlCol="0" anchor="ctr"/>
+          <a:lstStyle/>
+          <a:p>
+            <a:pPr algn="ctr"/>
+            <a:endParaRPr lang="en-IN">
+              <a:solidFill>
+                <a:schemeClr val="bg1"/>
+              </a:solidFill>
+            </a:endParaRPr>
+          </a:p>
+        </p:txBody>
+      </p:sp>
+      <p:sp>
+        <p:nvSpPr>
+          <p:cNvPr id="10" name="Rectangle 8">
+            <a:extLst>
+              <a:ext uri="{FF2B5EF4-FFF2-40B4-BE49-F238E27FC236}">
+                <a16:creationId xmlns:a16="http://schemas.microsoft.com/office/drawing/2014/main" id="{389B8C2B-1FCC-774A-B328-3387F82EF7AF}"/>
+              </a:ext>
+            </a:extLst>
+          </p:cNvPr>
+          <p:cNvSpPr/>
+          <p:nvPr/>
+        </p:nvSpPr>
+        <p:spPr>
+          <a:xfrm>
+            <a:off x="2671041" y="1317538"/>
+            <a:ext cx="1589103" cy="346760"/>
+          </a:xfrm>
+          <a:prstGeom prst="rect">
+            <a:avLst/>
+          </a:prstGeom>
+          <a:ln/>
+        </p:spPr>
+        <p:style>
+          <a:lnRef idx="2">
+            <a:schemeClr val="accent3">
+              <a:shade val="50000"/>
+            </a:schemeClr>
+          </a:lnRef>
+          <a:fillRef idx="1">
+            <a:schemeClr val="accent3"/>
+          </a:fillRef>
+          <a:effectRef idx="0">
+            <a:schemeClr val="accent3"/>
+          </a:effectRef>
+          <a:fontRef idx="minor">
+            <a:schemeClr val="lt1"/>
+          </a:fontRef>
+        </p:style>
+        <p:txBody>
+          <a:bodyPr rtlCol="0" anchor="ctr"/>
+          <a:lstStyle/>
+          <a:p>
+            <a:pPr algn="ctr"/>
+            <a:r>
+              <a:rPr lang="en-US" sz="1400" b="1" i="1" dirty="0">
+                <a:solidFill>
+                  <a:schemeClr val="bg1"/>
+                </a:solidFill>
+              </a:rPr>
+              <a:t>Command</a:t>
+            </a:r>
+            <a:endParaRPr lang="en-SG" sz="1200" b="1" i="1" dirty="0">
+              <a:solidFill>
+                <a:schemeClr val="bg1"/>
+              </a:solidFill>
+            </a:endParaRPr>
+          </a:p>
+        </p:txBody>
+      </p:sp>
+      <p:sp>
+        <p:nvSpPr>
+          <p:cNvPr id="11" name="Rectangle 8">
+            <a:extLst>
+              <a:ext uri="{FF2B5EF4-FFF2-40B4-BE49-F238E27FC236}">
+                <a16:creationId xmlns:a16="http://schemas.microsoft.com/office/drawing/2014/main" id="{F098972C-035C-484A-AFB6-7661ED85C19B}"/>
+              </a:ext>
+            </a:extLst>
+          </p:cNvPr>
+          <p:cNvSpPr/>
+          <p:nvPr/>
+        </p:nvSpPr>
+        <p:spPr>
+          <a:xfrm>
+            <a:off x="2819400" y="2730730"/>
+            <a:ext cx="1259718" cy="346760"/>
+          </a:xfrm>
+          <a:prstGeom prst="rect">
+            <a:avLst/>
+          </a:prstGeom>
+          <a:ln/>
+        </p:spPr>
+        <p:style>
+          <a:lnRef idx="2">
+            <a:schemeClr val="accent3">
+              <a:shade val="50000"/>
+            </a:schemeClr>
+          </a:lnRef>
+          <a:fillRef idx="1">
+            <a:schemeClr val="accent3"/>
+          </a:fillRef>
+          <a:effectRef idx="0">
+            <a:schemeClr val="accent3"/>
+          </a:effectRef>
+          <a:fontRef idx="minor">
+            <a:schemeClr val="lt1"/>
+          </a:fontRef>
+        </p:style>
+        <p:txBody>
+          <a:bodyPr rtlCol="0" anchor="ctr"/>
+          <a:lstStyle/>
+          <a:p>
+            <a:pPr algn="ctr"/>
+            <a:r>
+              <a:rPr lang="en-US" sz="1200" b="1" dirty="0">
+                <a:solidFill>
+                  <a:schemeClr val="bg1"/>
+                </a:solidFill>
+              </a:rPr>
+              <a:t>File</a:t>
+            </a:r>
+            <a:endParaRPr lang="en-SG" sz="1050" b="1" dirty="0">
+              <a:solidFill>
+                <a:schemeClr val="bg1"/>
+              </a:solidFill>
+            </a:endParaRPr>
+          </a:p>
+        </p:txBody>
+      </p:sp>
+      <p:sp>
+        <p:nvSpPr>
+          <p:cNvPr id="12" name="Diamond 11">
+            <a:extLst>
+              <a:ext uri="{FF2B5EF4-FFF2-40B4-BE49-F238E27FC236}">
+                <a16:creationId xmlns:a16="http://schemas.microsoft.com/office/drawing/2014/main" id="{6E42F9EE-166A-6848-B340-2535CA643215}"/>
+              </a:ext>
+            </a:extLst>
+          </p:cNvPr>
+          <p:cNvSpPr/>
+          <p:nvPr/>
+        </p:nvSpPr>
+        <p:spPr>
+          <a:xfrm>
+            <a:off x="3351326" y="2364134"/>
+            <a:ext cx="195865" cy="186962"/>
+          </a:xfrm>
+          <a:prstGeom prst="diamond">
+            <a:avLst/>
+          </a:prstGeom>
+          <a:ln/>
+        </p:spPr>
+        <p:style>
+          <a:lnRef idx="2">
+            <a:schemeClr val="accent3">
+              <a:shade val="50000"/>
+            </a:schemeClr>
+          </a:lnRef>
+          <a:fillRef idx="1">
+            <a:schemeClr val="accent3"/>
+          </a:fillRef>
+          <a:effectRef idx="0">
+            <a:schemeClr val="accent3"/>
+          </a:effectRef>
+          <a:fontRef idx="minor">
+            <a:schemeClr val="lt1"/>
+          </a:fontRef>
+        </p:style>
+        <p:txBody>
+          <a:bodyPr rtlCol="0" anchor="ctr"/>
+          <a:lstStyle/>
+          <a:p>
+            <a:pPr algn="ctr"/>
+            <a:endParaRPr lang="en-IN">
+              <a:solidFill>
+                <a:schemeClr val="bg1"/>
+              </a:solidFill>
+            </a:endParaRPr>
+          </a:p>
+        </p:txBody>
+      </p:sp>
+      <p:cxnSp>
+        <p:nvCxnSpPr>
+          <p:cNvPr id="13" name="Straight Connector 12">
+            <a:extLst>
+              <a:ext uri="{FF2B5EF4-FFF2-40B4-BE49-F238E27FC236}">
+                <a16:creationId xmlns:a16="http://schemas.microsoft.com/office/drawing/2014/main" id="{5332BE21-1550-4043-B8C0-BF5F0737F050}"/>
+              </a:ext>
+            </a:extLst>
+          </p:cNvPr>
+          <p:cNvCxnSpPr>
+            <a:cxnSpLocks/>
+            <a:stCxn id="12" idx="2"/>
+            <a:endCxn id="11" idx="0"/>
+          </p:cNvCxnSpPr>
+          <p:nvPr/>
+        </p:nvCxnSpPr>
+        <p:spPr>
+          <a:xfrm>
+            <a:off x="3449259" y="2551096"/>
+            <a:ext cx="0" cy="179634"/>
+          </a:xfrm>
+          <a:prstGeom prst="line">
+            <a:avLst/>
+          </a:prstGeom>
+        </p:spPr>
+        <p:style>
+          <a:lnRef idx="2">
+            <a:schemeClr val="accent3">
+              <a:shade val="50000"/>
+            </a:schemeClr>
+          </a:lnRef>
+          <a:fillRef idx="1">
+            <a:schemeClr val="accent3"/>
+          </a:fillRef>
+          <a:effectRef idx="0">
+            <a:schemeClr val="accent3"/>
+          </a:effectRef>
+          <a:fontRef idx="minor">
+            <a:schemeClr val="lt1"/>
+          </a:fontRef>
+        </p:style>
+      </p:cxnSp>
+      <p:sp>
+        <p:nvSpPr>
+          <p:cNvPr id="19" name="TextBox 18">
+            <a:extLst>
+              <a:ext uri="{FF2B5EF4-FFF2-40B4-BE49-F238E27FC236}">
+                <a16:creationId xmlns:a16="http://schemas.microsoft.com/office/drawing/2014/main" id="{1AF4D04D-CD12-CE44-91C6-DE706474572D}"/>
+              </a:ext>
+            </a:extLst>
+          </p:cNvPr>
+          <p:cNvSpPr txBox="1"/>
+          <p:nvPr/>
+        </p:nvSpPr>
+        <p:spPr>
+          <a:xfrm>
+            <a:off x="3124200" y="2435423"/>
+            <a:ext cx="276038" cy="307777"/>
+          </a:xfrm>
+          <a:prstGeom prst="rect">
+            <a:avLst/>
+          </a:prstGeom>
+          <a:noFill/>
+        </p:spPr>
+        <p:txBody>
+          <a:bodyPr wrap="none" rtlCol="0">
+            <a:spAutoFit/>
+          </a:bodyPr>
+          <a:lstStyle/>
+          <a:p>
+            <a:r>
+              <a:rPr lang="en-US" sz="1400" dirty="0"/>
+              <a:t>1</a:t>
+            </a:r>
+            <a:endParaRPr lang="en-US" dirty="0"/>
+          </a:p>
+        </p:txBody>
+      </p:sp>
     </p:spTree>
     <p:extLst>
       <p:ext uri="{BB962C8B-B14F-4D97-AF65-F5344CB8AC3E}">

</xml_diff>